<commit_message>
acpt: add scenarios for ChartTitle.text_frame
Including scenarios for ChartTitle.has_text_frame
</commit_message>
<xml_diff>
--- a/features/steps/test_files/cht-chart-props.pptx
+++ b/features/steps/test_files/cht-chart-props.pptx
@@ -6,6 +6,7 @@
   </p:sldMasterIdLst>
   <p:sldIdLst>
     <p:sldId id="256" r:id="rId2"/>
+    <p:sldId id="257" r:id="rId3"/>
   </p:sldIdLst>
   <p:sldSz cx="9144000" cy="6858000" type="screen4x3"/>
   <p:notesSz cx="6858000" cy="9144000"/>
@@ -574,6 +575,563 @@
     </a:p>
   </c:txPr>
   <c:externalData r:id="rId1">
+    <c:autoUpdate val="0"/>
+  </c:externalData>
+</c:chartSpace>
+</file>
+
+<file path=ppt/charts/chart3.xml><?xml version="1.0" encoding="utf-8"?>
+<c:chartSpace xmlns:c="http://schemas.openxmlformats.org/drawingml/2006/chart" xmlns:a="http://schemas.openxmlformats.org/drawingml/2006/main" xmlns:r="http://schemas.openxmlformats.org/officeDocument/2006/relationships">
+  <c:date1904 val="0"/>
+  <c:lang val="en-US"/>
+  <c:roundedCorners val="0"/>
+  <mc:AlternateContent xmlns:mc="http://schemas.openxmlformats.org/markup-compatibility/2006">
+    <mc:Choice xmlns:c14="http://schemas.microsoft.com/office/drawing/2007/8/2/chart" Requires="c14">
+      <c14:style val="118"/>
+    </mc:Choice>
+    <mc:Fallback>
+      <c:style val="18"/>
+    </mc:Fallback>
+  </mc:AlternateContent>
+  <c:chart>
+    <c:title>
+      <c:layout/>
+      <c:overlay val="0"/>
+    </c:title>
+    <c:autoTitleDeleted val="0"/>
+    <c:plotArea>
+      <c:layout/>
+      <c:barChart>
+        <c:barDir val="col"/>
+        <c:grouping val="clustered"/>
+        <c:varyColors val="0"/>
+        <c:ser>
+          <c:idx val="0"/>
+          <c:order val="0"/>
+          <c:tx>
+            <c:strRef>
+              <c:f>Sheet1!$B$1</c:f>
+              <c:strCache>
+                <c:ptCount val="1"/>
+                <c:pt idx="0">
+                  <c:v>Series 1</c:v>
+                </c:pt>
+              </c:strCache>
+            </c:strRef>
+          </c:tx>
+          <c:invertIfNegative val="0"/>
+          <c:cat>
+            <c:strRef>
+              <c:f>Sheet1!$A$2:$A$5</c:f>
+              <c:strCache>
+                <c:ptCount val="4"/>
+                <c:pt idx="0">
+                  <c:v>Category 1</c:v>
+                </c:pt>
+                <c:pt idx="1">
+                  <c:v>Category 2</c:v>
+                </c:pt>
+                <c:pt idx="2">
+                  <c:v>Category 3</c:v>
+                </c:pt>
+                <c:pt idx="3">
+                  <c:v>Category 4</c:v>
+                </c:pt>
+              </c:strCache>
+            </c:strRef>
+          </c:cat>
+          <c:val>
+            <c:numRef>
+              <c:f>Sheet1!$B$2:$B$5</c:f>
+              <c:numCache>
+                <c:formatCode>General</c:formatCode>
+                <c:ptCount val="4"/>
+                <c:pt idx="0">
+                  <c:v>4.3</c:v>
+                </c:pt>
+                <c:pt idx="1">
+                  <c:v>2.5</c:v>
+                </c:pt>
+                <c:pt idx="2">
+                  <c:v>3.5</c:v>
+                </c:pt>
+                <c:pt idx="3">
+                  <c:v>4.5</c:v>
+                </c:pt>
+              </c:numCache>
+            </c:numRef>
+          </c:val>
+        </c:ser>
+        <c:ser>
+          <c:idx val="1"/>
+          <c:order val="1"/>
+          <c:tx>
+            <c:strRef>
+              <c:f>Sheet1!$C$1</c:f>
+              <c:strCache>
+                <c:ptCount val="1"/>
+                <c:pt idx="0">
+                  <c:v>Series 2</c:v>
+                </c:pt>
+              </c:strCache>
+            </c:strRef>
+          </c:tx>
+          <c:invertIfNegative val="0"/>
+          <c:cat>
+            <c:strRef>
+              <c:f>Sheet1!$A$2:$A$5</c:f>
+              <c:strCache>
+                <c:ptCount val="4"/>
+                <c:pt idx="0">
+                  <c:v>Category 1</c:v>
+                </c:pt>
+                <c:pt idx="1">
+                  <c:v>Category 2</c:v>
+                </c:pt>
+                <c:pt idx="2">
+                  <c:v>Category 3</c:v>
+                </c:pt>
+                <c:pt idx="3">
+                  <c:v>Category 4</c:v>
+                </c:pt>
+              </c:strCache>
+            </c:strRef>
+          </c:cat>
+          <c:val>
+            <c:numRef>
+              <c:f>Sheet1!$C$2:$C$5</c:f>
+              <c:numCache>
+                <c:formatCode>General</c:formatCode>
+                <c:ptCount val="4"/>
+                <c:pt idx="0">
+                  <c:v>2.4</c:v>
+                </c:pt>
+                <c:pt idx="1">
+                  <c:v>4.4</c:v>
+                </c:pt>
+                <c:pt idx="2">
+                  <c:v>1.8</c:v>
+                </c:pt>
+                <c:pt idx="3">
+                  <c:v>2.8</c:v>
+                </c:pt>
+              </c:numCache>
+            </c:numRef>
+          </c:val>
+        </c:ser>
+        <c:ser>
+          <c:idx val="2"/>
+          <c:order val="2"/>
+          <c:tx>
+            <c:strRef>
+              <c:f>Sheet1!$D$1</c:f>
+              <c:strCache>
+                <c:ptCount val="1"/>
+                <c:pt idx="0">
+                  <c:v>Series 3</c:v>
+                </c:pt>
+              </c:strCache>
+            </c:strRef>
+          </c:tx>
+          <c:invertIfNegative val="0"/>
+          <c:cat>
+            <c:strRef>
+              <c:f>Sheet1!$A$2:$A$5</c:f>
+              <c:strCache>
+                <c:ptCount val="4"/>
+                <c:pt idx="0">
+                  <c:v>Category 1</c:v>
+                </c:pt>
+                <c:pt idx="1">
+                  <c:v>Category 2</c:v>
+                </c:pt>
+                <c:pt idx="2">
+                  <c:v>Category 3</c:v>
+                </c:pt>
+                <c:pt idx="3">
+                  <c:v>Category 4</c:v>
+                </c:pt>
+              </c:strCache>
+            </c:strRef>
+          </c:cat>
+          <c:val>
+            <c:numRef>
+              <c:f>Sheet1!$D$2:$D$5</c:f>
+              <c:numCache>
+                <c:formatCode>General</c:formatCode>
+                <c:ptCount val="4"/>
+                <c:pt idx="0">
+                  <c:v>2.0</c:v>
+                </c:pt>
+                <c:pt idx="1">
+                  <c:v>2.0</c:v>
+                </c:pt>
+                <c:pt idx="2">
+                  <c:v>3.0</c:v>
+                </c:pt>
+                <c:pt idx="3">
+                  <c:v>5.0</c:v>
+                </c:pt>
+              </c:numCache>
+            </c:numRef>
+          </c:val>
+        </c:ser>
+        <c:dLbls>
+          <c:showLegendKey val="0"/>
+          <c:showVal val="0"/>
+          <c:showCatName val="0"/>
+          <c:showSerName val="0"/>
+          <c:showPercent val="0"/>
+          <c:showBubbleSize val="0"/>
+        </c:dLbls>
+        <c:gapWidth val="150"/>
+        <c:axId val="-2142120712"/>
+        <c:axId val="-2141715800"/>
+      </c:barChart>
+      <c:catAx>
+        <c:axId val="-2142120712"/>
+        <c:scaling>
+          <c:orientation val="minMax"/>
+        </c:scaling>
+        <c:delete val="0"/>
+        <c:axPos val="b"/>
+        <c:majorTickMark val="out"/>
+        <c:minorTickMark val="none"/>
+        <c:tickLblPos val="nextTo"/>
+        <c:crossAx val="-2141715800"/>
+        <c:crosses val="autoZero"/>
+        <c:auto val="1"/>
+        <c:lblAlgn val="ctr"/>
+        <c:lblOffset val="100"/>
+        <c:noMultiLvlLbl val="0"/>
+      </c:catAx>
+      <c:valAx>
+        <c:axId val="-2141715800"/>
+        <c:scaling>
+          <c:orientation val="minMax"/>
+        </c:scaling>
+        <c:delete val="0"/>
+        <c:axPos val="l"/>
+        <c:majorGridlines/>
+        <c:numFmt formatCode="General" sourceLinked="1"/>
+        <c:majorTickMark val="out"/>
+        <c:minorTickMark val="none"/>
+        <c:tickLblPos val="nextTo"/>
+        <c:crossAx val="-2142120712"/>
+        <c:crosses val="autoZero"/>
+        <c:crossBetween val="between"/>
+      </c:valAx>
+    </c:plotArea>
+    <c:plotVisOnly val="1"/>
+    <c:dispBlanksAs val="gap"/>
+    <c:showDLblsOverMax val="0"/>
+  </c:chart>
+  <c:spPr>
+    <a:ln w="19050">
+      <a:solidFill>
+        <a:schemeClr val="bg1">
+          <a:lumMod val="75000"/>
+        </a:schemeClr>
+      </a:solidFill>
+    </a:ln>
+  </c:spPr>
+  <c:txPr>
+    <a:bodyPr/>
+    <a:lstStyle/>
+    <a:p>
+      <a:pPr>
+        <a:defRPr sz="1800"/>
+      </a:pPr>
+      <a:endParaRPr lang="en-US"/>
+    </a:p>
+  </c:txPr>
+  <c:externalData r:id="rId1">
+    <c:autoUpdate val="0"/>
+  </c:externalData>
+</c:chartSpace>
+</file>
+
+<file path=ppt/charts/chart4.xml><?xml version="1.0" encoding="utf-8"?>
+<c:chartSpace xmlns:c="http://schemas.openxmlformats.org/drawingml/2006/chart" xmlns:a="http://schemas.openxmlformats.org/drawingml/2006/main" xmlns:r="http://schemas.openxmlformats.org/officeDocument/2006/relationships">
+  <c:date1904 val="0"/>
+  <c:lang val="en-US"/>
+  <c:roundedCorners val="0"/>
+  <mc:AlternateContent xmlns:mc="http://schemas.openxmlformats.org/markup-compatibility/2006">
+    <mc:Choice xmlns:c14="http://schemas.microsoft.com/office/drawing/2007/8/2/chart" Requires="c14">
+      <c14:style val="118"/>
+    </mc:Choice>
+    <mc:Fallback>
+      <c:style val="18"/>
+    </mc:Fallback>
+  </mc:AlternateContent>
+  <c:clrMapOvr bg1="lt1" tx1="dk1" bg2="lt2" tx2="dk2" accent1="accent1" accent2="accent2" accent3="accent3" accent4="accent4" accent5="accent5" accent6="accent6" hlink="hlink" folHlink="folHlink"/>
+  <c:chart>
+    <c:title>
+      <c:tx>
+        <c:rich>
+          <a:bodyPr/>
+          <a:lstStyle/>
+          <a:p>
+            <a:pPr>
+              <a:defRPr/>
+            </a:pPr>
+            <a:r>
+              <a:rPr lang="en-US" dirty="0" smtClean="0"/>
+              <a:t>Explicit Chart Title</a:t>
+            </a:r>
+            <a:endParaRPr lang="en-US" dirty="0"/>
+          </a:p>
+        </c:rich>
+      </c:tx>
+      <c:layout/>
+      <c:overlay val="0"/>
+    </c:title>
+    <c:autoTitleDeleted val="0"/>
+    <c:plotArea>
+      <c:layout/>
+      <c:barChart>
+        <c:barDir val="col"/>
+        <c:grouping val="clustered"/>
+        <c:varyColors val="0"/>
+        <c:ser>
+          <c:idx val="0"/>
+          <c:order val="0"/>
+          <c:tx>
+            <c:strRef>
+              <c:f>Sheet1!$B$1</c:f>
+              <c:strCache>
+                <c:ptCount val="1"/>
+                <c:pt idx="0">
+                  <c:v>Series 1</c:v>
+                </c:pt>
+              </c:strCache>
+            </c:strRef>
+          </c:tx>
+          <c:invertIfNegative val="0"/>
+          <c:cat>
+            <c:strRef>
+              <c:f>Sheet1!$A$2:$A$5</c:f>
+              <c:strCache>
+                <c:ptCount val="4"/>
+                <c:pt idx="0">
+                  <c:v>Category 1</c:v>
+                </c:pt>
+                <c:pt idx="1">
+                  <c:v>Category 2</c:v>
+                </c:pt>
+                <c:pt idx="2">
+                  <c:v>Category 3</c:v>
+                </c:pt>
+                <c:pt idx="3">
+                  <c:v>Category 4</c:v>
+                </c:pt>
+              </c:strCache>
+            </c:strRef>
+          </c:cat>
+          <c:val>
+            <c:numRef>
+              <c:f>Sheet1!$B$2:$B$5</c:f>
+              <c:numCache>
+                <c:formatCode>General</c:formatCode>
+                <c:ptCount val="4"/>
+                <c:pt idx="0">
+                  <c:v>4.3</c:v>
+                </c:pt>
+                <c:pt idx="1">
+                  <c:v>2.5</c:v>
+                </c:pt>
+                <c:pt idx="2">
+                  <c:v>3.5</c:v>
+                </c:pt>
+                <c:pt idx="3">
+                  <c:v>4.5</c:v>
+                </c:pt>
+              </c:numCache>
+            </c:numRef>
+          </c:val>
+        </c:ser>
+        <c:ser>
+          <c:idx val="1"/>
+          <c:order val="1"/>
+          <c:tx>
+            <c:strRef>
+              <c:f>Sheet1!$C$1</c:f>
+              <c:strCache>
+                <c:ptCount val="1"/>
+                <c:pt idx="0">
+                  <c:v>Series 2</c:v>
+                </c:pt>
+              </c:strCache>
+            </c:strRef>
+          </c:tx>
+          <c:invertIfNegative val="0"/>
+          <c:cat>
+            <c:strRef>
+              <c:f>Sheet1!$A$2:$A$5</c:f>
+              <c:strCache>
+                <c:ptCount val="4"/>
+                <c:pt idx="0">
+                  <c:v>Category 1</c:v>
+                </c:pt>
+                <c:pt idx="1">
+                  <c:v>Category 2</c:v>
+                </c:pt>
+                <c:pt idx="2">
+                  <c:v>Category 3</c:v>
+                </c:pt>
+                <c:pt idx="3">
+                  <c:v>Category 4</c:v>
+                </c:pt>
+              </c:strCache>
+            </c:strRef>
+          </c:cat>
+          <c:val>
+            <c:numRef>
+              <c:f>Sheet1!$C$2:$C$5</c:f>
+              <c:numCache>
+                <c:formatCode>General</c:formatCode>
+                <c:ptCount val="4"/>
+                <c:pt idx="0">
+                  <c:v>2.4</c:v>
+                </c:pt>
+                <c:pt idx="1">
+                  <c:v>4.4</c:v>
+                </c:pt>
+                <c:pt idx="2">
+                  <c:v>1.8</c:v>
+                </c:pt>
+                <c:pt idx="3">
+                  <c:v>2.8</c:v>
+                </c:pt>
+              </c:numCache>
+            </c:numRef>
+          </c:val>
+        </c:ser>
+        <c:ser>
+          <c:idx val="2"/>
+          <c:order val="2"/>
+          <c:tx>
+            <c:strRef>
+              <c:f>Sheet1!$D$1</c:f>
+              <c:strCache>
+                <c:ptCount val="1"/>
+                <c:pt idx="0">
+                  <c:v>Series 3</c:v>
+                </c:pt>
+              </c:strCache>
+            </c:strRef>
+          </c:tx>
+          <c:invertIfNegative val="0"/>
+          <c:cat>
+            <c:strRef>
+              <c:f>Sheet1!$A$2:$A$5</c:f>
+              <c:strCache>
+                <c:ptCount val="4"/>
+                <c:pt idx="0">
+                  <c:v>Category 1</c:v>
+                </c:pt>
+                <c:pt idx="1">
+                  <c:v>Category 2</c:v>
+                </c:pt>
+                <c:pt idx="2">
+                  <c:v>Category 3</c:v>
+                </c:pt>
+                <c:pt idx="3">
+                  <c:v>Category 4</c:v>
+                </c:pt>
+              </c:strCache>
+            </c:strRef>
+          </c:cat>
+          <c:val>
+            <c:numRef>
+              <c:f>Sheet1!$D$2:$D$5</c:f>
+              <c:numCache>
+                <c:formatCode>General</c:formatCode>
+                <c:ptCount val="4"/>
+                <c:pt idx="0">
+                  <c:v>2.0</c:v>
+                </c:pt>
+                <c:pt idx="1">
+                  <c:v>2.0</c:v>
+                </c:pt>
+                <c:pt idx="2">
+                  <c:v>3.0</c:v>
+                </c:pt>
+                <c:pt idx="3">
+                  <c:v>5.0</c:v>
+                </c:pt>
+              </c:numCache>
+            </c:numRef>
+          </c:val>
+        </c:ser>
+        <c:dLbls>
+          <c:showLegendKey val="0"/>
+          <c:showVal val="0"/>
+          <c:showCatName val="0"/>
+          <c:showSerName val="0"/>
+          <c:showPercent val="0"/>
+          <c:showBubbleSize val="0"/>
+        </c:dLbls>
+        <c:gapWidth val="150"/>
+        <c:axId val="-2141630696"/>
+        <c:axId val="-2132393208"/>
+      </c:barChart>
+      <c:catAx>
+        <c:axId val="-2141630696"/>
+        <c:scaling>
+          <c:orientation val="minMax"/>
+        </c:scaling>
+        <c:delete val="0"/>
+        <c:axPos val="b"/>
+        <c:majorTickMark val="out"/>
+        <c:minorTickMark val="none"/>
+        <c:tickLblPos val="nextTo"/>
+        <c:crossAx val="-2132393208"/>
+        <c:crosses val="autoZero"/>
+        <c:auto val="1"/>
+        <c:lblAlgn val="ctr"/>
+        <c:lblOffset val="100"/>
+        <c:noMultiLvlLbl val="0"/>
+      </c:catAx>
+      <c:valAx>
+        <c:axId val="-2132393208"/>
+        <c:scaling>
+          <c:orientation val="minMax"/>
+        </c:scaling>
+        <c:delete val="0"/>
+        <c:axPos val="l"/>
+        <c:majorGridlines/>
+        <c:numFmt formatCode="General" sourceLinked="1"/>
+        <c:majorTickMark val="out"/>
+        <c:minorTickMark val="none"/>
+        <c:tickLblPos val="nextTo"/>
+        <c:crossAx val="-2141630696"/>
+        <c:crosses val="autoZero"/>
+        <c:crossBetween val="between"/>
+      </c:valAx>
+    </c:plotArea>
+    <c:plotVisOnly val="1"/>
+    <c:dispBlanksAs val="gap"/>
+    <c:showDLblsOverMax val="0"/>
+  </c:chart>
+  <c:spPr>
+    <a:ln w="19050">
+      <a:solidFill>
+        <a:srgbClr val="8064A2"/>
+      </a:solidFill>
+    </a:ln>
+  </c:spPr>
+  <c:txPr>
+    <a:bodyPr/>
+    <a:lstStyle/>
+    <a:p>
+      <a:pPr>
+        <a:defRPr sz="1800"/>
+      </a:pPr>
+      <a:endParaRPr lang="en-US"/>
+    </a:p>
+  </c:txPr>
+  <c:externalData r:id="rId2">
     <c:autoUpdate val="0"/>
   </c:externalData>
 </c:chartSpace>
@@ -959,6 +1517,80 @@
 </p:sld>
 </file>
 
+<file path=ppt/slides/slide2.xml><?xml version="1.0" encoding="utf-8"?>
+<p:sld xmlns:a="http://schemas.openxmlformats.org/drawingml/2006/main" xmlns:r="http://schemas.openxmlformats.org/officeDocument/2006/relationships" xmlns:p="http://schemas.openxmlformats.org/presentationml/2006/main">
+  <p:cSld>
+    <p:spTree>
+      <p:nvGrpSpPr>
+        <p:cNvPr id="1" name=""/>
+        <p:cNvGrpSpPr/>
+        <p:nvPr/>
+      </p:nvGrpSpPr>
+      <p:grpSpPr>
+        <a:xfrm>
+          <a:off x="0" y="0"/>
+          <a:ext cx="0" cy="0"/>
+          <a:chOff x="0" y="0"/>
+          <a:chExt cx="0" cy="0"/>
+        </a:xfrm>
+      </p:grpSpPr>
+      <p:graphicFrame>
+        <p:nvGraphicFramePr>
+          <p:cNvPr id="2" name="Chart 1"/>
+          <p:cNvGraphicFramePr/>
+          <p:nvPr>
+            <p:extLst>
+              <p:ext uri="{D42A27DB-BD31-4B8C-83A1-F6EECF244321}">
+                <p14:modId xmlns:p14="http://schemas.microsoft.com/office/powerpoint/2010/main" val="3395444749"/>
+              </p:ext>
+            </p:extLst>
+          </p:nvPr>
+        </p:nvGraphicFramePr>
+        <p:xfrm>
+          <a:off x="1016000" y="1397000"/>
+          <a:ext cx="3048000" cy="4064000"/>
+        </p:xfrm>
+        <a:graphic>
+          <a:graphicData uri="http://schemas.openxmlformats.org/drawingml/2006/chart">
+            <c:chart xmlns:c="http://schemas.openxmlformats.org/drawingml/2006/chart" xmlns:r="http://schemas.openxmlformats.org/officeDocument/2006/relationships" r:id="rId2"/>
+          </a:graphicData>
+        </a:graphic>
+      </p:graphicFrame>
+      <p:graphicFrame>
+        <p:nvGraphicFramePr>
+          <p:cNvPr id="3" name="Chart 2"/>
+          <p:cNvGraphicFramePr/>
+          <p:nvPr>
+            <p:extLst>
+              <p:ext uri="{D42A27DB-BD31-4B8C-83A1-F6EECF244321}">
+                <p14:modId xmlns:p14="http://schemas.microsoft.com/office/powerpoint/2010/main" val="3154930841"/>
+              </p:ext>
+            </p:extLst>
+          </p:nvPr>
+        </p:nvGraphicFramePr>
+        <p:xfrm>
+          <a:off x="5080000" y="1397000"/>
+          <a:ext cx="3048000" cy="4064000"/>
+        </p:xfrm>
+        <a:graphic>
+          <a:graphicData uri="http://schemas.openxmlformats.org/drawingml/2006/chart">
+            <c:chart xmlns:c="http://schemas.openxmlformats.org/drawingml/2006/chart" xmlns:r="http://schemas.openxmlformats.org/officeDocument/2006/relationships" r:id="rId3"/>
+          </a:graphicData>
+        </a:graphic>
+      </p:graphicFrame>
+    </p:spTree>
+    <p:extLst>
+      <p:ext uri="{BB962C8B-B14F-4D97-AF65-F5344CB8AC3E}">
+        <p14:creationId xmlns:p14="http://schemas.microsoft.com/office/powerpoint/2010/main" val="2691560699"/>
+      </p:ext>
+    </p:extLst>
+  </p:cSld>
+  <p:clrMapOvr>
+    <a:masterClrMapping/>
+  </p:clrMapOvr>
+</p:sld>
+</file>
+
 <file path=ppt/theme/theme1.xml><?xml version="1.0" encoding="utf-8"?>
 <a:theme xmlns:a="http://schemas.openxmlformats.org/drawingml/2006/main" name="Office Theme">
   <a:themeElements>
@@ -1240,4 +1872,283 @@
   <a:objectDefaults/>
   <a:extraClrSchemeLst/>
 </a:theme>
+</file>
+
+<file path=ppt/theme/themeOverride1.xml><?xml version="1.0" encoding="utf-8"?>
+<a:themeOverride xmlns:a="http://schemas.openxmlformats.org/drawingml/2006/main">
+  <a:clrScheme name="Office">
+    <a:dk1>
+      <a:sysClr val="windowText" lastClr="000000"/>
+    </a:dk1>
+    <a:lt1>
+      <a:sysClr val="window" lastClr="FFFFFF"/>
+    </a:lt1>
+    <a:dk2>
+      <a:srgbClr val="1F497D"/>
+    </a:dk2>
+    <a:lt2>
+      <a:srgbClr val="EEECE1"/>
+    </a:lt2>
+    <a:accent1>
+      <a:srgbClr val="4F81BD"/>
+    </a:accent1>
+    <a:accent2>
+      <a:srgbClr val="C0504D"/>
+    </a:accent2>
+    <a:accent3>
+      <a:srgbClr val="9BBB59"/>
+    </a:accent3>
+    <a:accent4>
+      <a:srgbClr val="8064A2"/>
+    </a:accent4>
+    <a:accent5>
+      <a:srgbClr val="4BACC6"/>
+    </a:accent5>
+    <a:accent6>
+      <a:srgbClr val="F79646"/>
+    </a:accent6>
+    <a:hlink>
+      <a:srgbClr val="0000FF"/>
+    </a:hlink>
+    <a:folHlink>
+      <a:srgbClr val="800080"/>
+    </a:folHlink>
+  </a:clrScheme>
+  <a:fontScheme name="Office">
+    <a:majorFont>
+      <a:latin typeface="Calibri"/>
+      <a:ea typeface=""/>
+      <a:cs typeface=""/>
+      <a:font script="Jpan" typeface="ＭＳ Ｐゴシック"/>
+      <a:font script="Hang" typeface="맑은 고딕"/>
+      <a:font script="Hans" typeface="宋体"/>
+      <a:font script="Hant" typeface="新細明體"/>
+      <a:font script="Arab" typeface="Times New Roman"/>
+      <a:font script="Hebr" typeface="Times New Roman"/>
+      <a:font script="Thai" typeface="Angsana New"/>
+      <a:font script="Ethi" typeface="Nyala"/>
+      <a:font script="Beng" typeface="Vrinda"/>
+      <a:font script="Gujr" typeface="Shruti"/>
+      <a:font script="Khmr" typeface="MoolBoran"/>
+      <a:font script="Knda" typeface="Tunga"/>
+      <a:font script="Guru" typeface="Raavi"/>
+      <a:font script="Cans" typeface="Euphemia"/>
+      <a:font script="Cher" typeface="Plantagenet Cherokee"/>
+      <a:font script="Yiii" typeface="Microsoft Yi Baiti"/>
+      <a:font script="Tibt" typeface="Microsoft Himalaya"/>
+      <a:font script="Thaa" typeface="MV Boli"/>
+      <a:font script="Deva" typeface="Mangal"/>
+      <a:font script="Telu" typeface="Gautami"/>
+      <a:font script="Taml" typeface="Latha"/>
+      <a:font script="Syrc" typeface="Estrangelo Edessa"/>
+      <a:font script="Orya" typeface="Kalinga"/>
+      <a:font script="Mlym" typeface="Kartika"/>
+      <a:font script="Laoo" typeface="DokChampa"/>
+      <a:font script="Sinh" typeface="Iskoola Pota"/>
+      <a:font script="Mong" typeface="Mongolian Baiti"/>
+      <a:font script="Viet" typeface="Times New Roman"/>
+      <a:font script="Uigh" typeface="Microsoft Uighur"/>
+    </a:majorFont>
+    <a:minorFont>
+      <a:latin typeface="Calibri"/>
+      <a:ea typeface=""/>
+      <a:cs typeface=""/>
+      <a:font script="Jpan" typeface="ＭＳ Ｐゴシック"/>
+      <a:font script="Hang" typeface="맑은 고딕"/>
+      <a:font script="Hans" typeface="宋体"/>
+      <a:font script="Hant" typeface="新細明體"/>
+      <a:font script="Arab" typeface="Arial"/>
+      <a:font script="Hebr" typeface="Arial"/>
+      <a:font script="Thai" typeface="Cordia New"/>
+      <a:font script="Ethi" typeface="Nyala"/>
+      <a:font script="Beng" typeface="Vrinda"/>
+      <a:font script="Gujr" typeface="Shruti"/>
+      <a:font script="Khmr" typeface="DaunPenh"/>
+      <a:font script="Knda" typeface="Tunga"/>
+      <a:font script="Guru" typeface="Raavi"/>
+      <a:font script="Cans" typeface="Euphemia"/>
+      <a:font script="Cher" typeface="Plantagenet Cherokee"/>
+      <a:font script="Yiii" typeface="Microsoft Yi Baiti"/>
+      <a:font script="Tibt" typeface="Microsoft Himalaya"/>
+      <a:font script="Thaa" typeface="MV Boli"/>
+      <a:font script="Deva" typeface="Mangal"/>
+      <a:font script="Telu" typeface="Gautami"/>
+      <a:font script="Taml" typeface="Latha"/>
+      <a:font script="Syrc" typeface="Estrangelo Edessa"/>
+      <a:font script="Orya" typeface="Kalinga"/>
+      <a:font script="Mlym" typeface="Kartika"/>
+      <a:font script="Laoo" typeface="DokChampa"/>
+      <a:font script="Sinh" typeface="Iskoola Pota"/>
+      <a:font script="Mong" typeface="Mongolian Baiti"/>
+      <a:font script="Viet" typeface="Arial"/>
+      <a:font script="Uigh" typeface="Microsoft Uighur"/>
+    </a:minorFont>
+  </a:fontScheme>
+  <a:fmtScheme name="Office">
+    <a:fillStyleLst>
+      <a:solidFill>
+        <a:schemeClr val="phClr"/>
+      </a:solidFill>
+      <a:gradFill rotWithShape="1">
+        <a:gsLst>
+          <a:gs pos="0">
+            <a:schemeClr val="phClr">
+              <a:tint val="50000"/>
+              <a:satMod val="300000"/>
+            </a:schemeClr>
+          </a:gs>
+          <a:gs pos="35000">
+            <a:schemeClr val="phClr">
+              <a:tint val="37000"/>
+              <a:satMod val="300000"/>
+            </a:schemeClr>
+          </a:gs>
+          <a:gs pos="100000">
+            <a:schemeClr val="phClr">
+              <a:tint val="15000"/>
+              <a:satMod val="350000"/>
+            </a:schemeClr>
+          </a:gs>
+        </a:gsLst>
+        <a:lin ang="16200000" scaled="1"/>
+      </a:gradFill>
+      <a:gradFill rotWithShape="1">
+        <a:gsLst>
+          <a:gs pos="0">
+            <a:schemeClr val="phClr">
+              <a:shade val="51000"/>
+              <a:satMod val="130000"/>
+            </a:schemeClr>
+          </a:gs>
+          <a:gs pos="80000">
+            <a:schemeClr val="phClr">
+              <a:shade val="93000"/>
+              <a:satMod val="130000"/>
+            </a:schemeClr>
+          </a:gs>
+          <a:gs pos="100000">
+            <a:schemeClr val="phClr">
+              <a:shade val="94000"/>
+              <a:satMod val="135000"/>
+            </a:schemeClr>
+          </a:gs>
+        </a:gsLst>
+        <a:lin ang="16200000" scaled="0"/>
+      </a:gradFill>
+    </a:fillStyleLst>
+    <a:lnStyleLst>
+      <a:ln w="9525" cap="flat" cmpd="sng" algn="ctr">
+        <a:solidFill>
+          <a:schemeClr val="phClr">
+            <a:shade val="95000"/>
+            <a:satMod val="105000"/>
+          </a:schemeClr>
+        </a:solidFill>
+        <a:prstDash val="solid"/>
+      </a:ln>
+      <a:ln w="25400" cap="flat" cmpd="sng" algn="ctr">
+        <a:solidFill>
+          <a:schemeClr val="phClr"/>
+        </a:solidFill>
+        <a:prstDash val="solid"/>
+      </a:ln>
+      <a:ln w="38100" cap="flat" cmpd="sng" algn="ctr">
+        <a:solidFill>
+          <a:schemeClr val="phClr"/>
+        </a:solidFill>
+        <a:prstDash val="solid"/>
+      </a:ln>
+    </a:lnStyleLst>
+    <a:effectStyleLst>
+      <a:effectStyle>
+        <a:effectLst>
+          <a:outerShdw blurRad="40000" dist="20000" dir="5400000" rotWithShape="0">
+            <a:srgbClr val="000000">
+              <a:alpha val="38000"/>
+            </a:srgbClr>
+          </a:outerShdw>
+        </a:effectLst>
+      </a:effectStyle>
+      <a:effectStyle>
+        <a:effectLst>
+          <a:outerShdw blurRad="40000" dist="23000" dir="5400000" rotWithShape="0">
+            <a:srgbClr val="000000">
+              <a:alpha val="35000"/>
+            </a:srgbClr>
+          </a:outerShdw>
+        </a:effectLst>
+      </a:effectStyle>
+      <a:effectStyle>
+        <a:effectLst>
+          <a:outerShdw blurRad="40000" dist="23000" dir="5400000" rotWithShape="0">
+            <a:srgbClr val="000000">
+              <a:alpha val="35000"/>
+            </a:srgbClr>
+          </a:outerShdw>
+        </a:effectLst>
+        <a:scene3d>
+          <a:camera prst="orthographicFront">
+            <a:rot lat="0" lon="0" rev="0"/>
+          </a:camera>
+          <a:lightRig rig="threePt" dir="t">
+            <a:rot lat="0" lon="0" rev="1200000"/>
+          </a:lightRig>
+        </a:scene3d>
+        <a:sp3d>
+          <a:bevelT w="63500" h="25400"/>
+        </a:sp3d>
+      </a:effectStyle>
+    </a:effectStyleLst>
+    <a:bgFillStyleLst>
+      <a:solidFill>
+        <a:schemeClr val="phClr"/>
+      </a:solidFill>
+      <a:gradFill rotWithShape="1">
+        <a:gsLst>
+          <a:gs pos="0">
+            <a:schemeClr val="phClr">
+              <a:tint val="40000"/>
+              <a:satMod val="350000"/>
+            </a:schemeClr>
+          </a:gs>
+          <a:gs pos="40000">
+            <a:schemeClr val="phClr">
+              <a:tint val="45000"/>
+              <a:shade val="99000"/>
+              <a:satMod val="350000"/>
+            </a:schemeClr>
+          </a:gs>
+          <a:gs pos="100000">
+            <a:schemeClr val="phClr">
+              <a:shade val="20000"/>
+              <a:satMod val="255000"/>
+            </a:schemeClr>
+          </a:gs>
+        </a:gsLst>
+        <a:path path="circle">
+          <a:fillToRect l="50000" t="-80000" r="50000" b="180000"/>
+        </a:path>
+      </a:gradFill>
+      <a:gradFill rotWithShape="1">
+        <a:gsLst>
+          <a:gs pos="0">
+            <a:schemeClr val="phClr">
+              <a:tint val="80000"/>
+              <a:satMod val="300000"/>
+            </a:schemeClr>
+          </a:gs>
+          <a:gs pos="100000">
+            <a:schemeClr val="phClr">
+              <a:shade val="30000"/>
+              <a:satMod val="200000"/>
+            </a:schemeClr>
+          </a:gs>
+        </a:gsLst>
+        <a:path path="circle">
+          <a:fillToRect l="50000" t="50000" r="50000" b="50000"/>
+        </a:path>
+      </a:gradFill>
+    </a:bgFillStyleLst>
+  </a:fmtScheme>
+</a:themeOverride>
 </file>
</xml_diff>